<commit_message>
Se separo el marco teorico
</commit_message>
<xml_diff>
--- a/Presentacion.pptx
+++ b/Presentacion.pptx
@@ -123,7 +123,7 @@
   </p:defaultTextStyle>
   <p:extLst>
     <p:ext uri="{EFAFB233-063F-42B5-8137-9DF3F51BA10A}">
-      <p15:sldGuideLst xmlns:p15="http://schemas.microsoft.com/office/powerpoint/2012/main" xmlns="">
+      <p15:sldGuideLst xmlns:p15="http://schemas.microsoft.com/office/powerpoint/2012/main">
         <p15:guide id="1" orient="horz" pos="2160">
           <p15:clr>
             <a:srgbClr val="A4A3A4"/>
@@ -2342,7 +2342,7 @@
           <a:p>
             <a:pPr algn="ctr"/>
             <a:r>
-              <a:rPr lang="es-ES_tradnl" sz="2400" b="1" dirty="0" smtClean="0">
+              <a:rPr lang="es-ES_tradnl" sz="2400" b="1" dirty="0">
                 <a:solidFill>
                   <a:schemeClr val="tx1">
                     <a:lumMod val="65000"/>
@@ -2354,21 +2354,11 @@
               </a:rPr>
               <a:t>Tesis</a:t>
             </a:r>
-            <a:endParaRPr lang="es-ES_tradnl" sz="2400" b="1" dirty="0">
-              <a:solidFill>
-                <a:schemeClr val="tx1">
-                  <a:lumMod val="65000"/>
-                  <a:lumOff val="35000"/>
-                </a:schemeClr>
-              </a:solidFill>
-              <a:latin typeface="Arial"/>
-              <a:cs typeface="Arial"/>
-            </a:endParaRPr>
           </a:p>
           <a:p>
             <a:pPr algn="ctr"/>
             <a:r>
-              <a:rPr lang="es-ES_tradnl" sz="2400" b="1" dirty="0" err="1" smtClean="0">
+              <a:rPr lang="es-ES_tradnl" sz="2400" b="1" dirty="0">
                 <a:solidFill>
                   <a:schemeClr val="tx1">
                     <a:lumMod val="65000"/>
@@ -2378,67 +2368,23 @@
                 <a:latin typeface="Arial"/>
                 <a:cs typeface="Arial"/>
               </a:rPr>
-              <a:t>Computacion</a:t>
-            </a:r>
-            <a:r>
-              <a:rPr lang="es-ES_tradnl" sz="2400" b="1" dirty="0" smtClean="0">
-                <a:solidFill>
-                  <a:schemeClr val="tx1">
-                    <a:lumMod val="65000"/>
-                    <a:lumOff val="35000"/>
+              <a:t>Computación Inteligente Aplicada</a:t>
+            </a:r>
+          </a:p>
+          <a:p>
+            <a:pPr algn="ctr"/>
+            <a:r>
+              <a:rPr lang="es-ES_tradnl" sz="2000" dirty="0">
+                <a:solidFill>
+                  <a:schemeClr val="accent2">
+                    <a:lumMod val="75000"/>
                   </a:schemeClr>
                 </a:solidFill>
                 <a:latin typeface="Arial"/>
                 <a:cs typeface="Arial"/>
               </a:rPr>
-              <a:t> Inteligente Aplicada</a:t>
-            </a:r>
-            <a:endParaRPr lang="es-ES_tradnl" sz="2400" b="1" dirty="0">
-              <a:solidFill>
-                <a:schemeClr val="tx1">
-                  <a:lumMod val="65000"/>
-                  <a:lumOff val="35000"/>
-                </a:schemeClr>
-              </a:solidFill>
-              <a:latin typeface="Arial"/>
-              <a:cs typeface="Arial"/>
-            </a:endParaRPr>
-          </a:p>
-          <a:p>
-            <a:pPr algn="ctr"/>
-            <a:r>
-              <a:rPr lang="es-ES_tradnl" sz="2000" dirty="0" smtClean="0">
-                <a:solidFill>
-                  <a:schemeClr val="accent2">
-                    <a:lumMod val="75000"/>
-                  </a:schemeClr>
-                </a:solidFill>
-                <a:latin typeface="Arial"/>
-                <a:cs typeface="Arial"/>
-              </a:rPr>
-              <a:t>Mtro. Juan Antonio Vega </a:t>
-            </a:r>
-            <a:r>
-              <a:rPr lang="es-ES_tradnl" sz="2000" dirty="0" err="1" smtClean="0">
-                <a:solidFill>
-                  <a:schemeClr val="accent2">
-                    <a:lumMod val="75000"/>
-                  </a:schemeClr>
-                </a:solidFill>
-                <a:latin typeface="Arial"/>
-                <a:cs typeface="Arial"/>
-              </a:rPr>
-              <a:t>Fernandez</a:t>
-            </a:r>
-            <a:endParaRPr lang="es-ES_tradnl" sz="2000" dirty="0">
-              <a:solidFill>
-                <a:schemeClr val="accent2">
-                  <a:lumMod val="75000"/>
-                </a:schemeClr>
-              </a:solidFill>
-              <a:latin typeface="Arial"/>
-              <a:cs typeface="Arial"/>
-            </a:endParaRPr>
+              <a:t>Mtro. Juan Antonio Vega Fernández</a:t>
+            </a:r>
           </a:p>
         </p:txBody>
       </p:sp>
@@ -2447,7 +2393,7 @@
           <p:cNvPr id="7" name="CuadroTexto 6">
             <a:extLst>
               <a:ext uri="{FF2B5EF4-FFF2-40B4-BE49-F238E27FC236}">
-                <a16:creationId xmlns="" xmlns:a16="http://schemas.microsoft.com/office/drawing/2014/main" id="{8E8A2F3C-924F-4B61-BD56-B083494DB9BE}"/>
+                <a16:creationId xmlns:a16="http://schemas.microsoft.com/office/drawing/2014/main" id="{8E8A2F3C-924F-4B61-BD56-B083494DB9BE}"/>
               </a:ext>
             </a:extLst>
           </p:cNvPr>
@@ -2472,7 +2418,7 @@
           <a:p>
             <a:pPr algn="ctr"/>
             <a:r>
-              <a:rPr lang="es-ES_tradnl" sz="2800" b="1" dirty="0" smtClean="0">
+              <a:rPr lang="es-ES_tradnl" sz="2800" b="1" dirty="0">
                 <a:solidFill>
                   <a:schemeClr val="tx1">
                     <a:lumMod val="65000"/>
@@ -2485,7 +2431,7 @@
               <a:t>Uso de Deep </a:t>
             </a:r>
             <a:r>
-              <a:rPr lang="es-ES_tradnl" sz="2800" b="1" dirty="0" err="1" smtClean="0">
+              <a:rPr lang="es-ES_tradnl" sz="2800" b="1" dirty="0" err="1">
                 <a:solidFill>
                   <a:schemeClr val="tx1">
                     <a:lumMod val="65000"/>
@@ -2498,7 +2444,7 @@
               <a:t>Learning</a:t>
             </a:r>
             <a:r>
-              <a:rPr lang="es-ES_tradnl" sz="2800" b="1" dirty="0" smtClean="0">
+              <a:rPr lang="es-ES_tradnl" sz="2800" b="1" dirty="0">
                 <a:solidFill>
                   <a:schemeClr val="tx1">
                     <a:lumMod val="65000"/>
@@ -2510,21 +2456,11 @@
               </a:rPr>
               <a:t> para composición musical </a:t>
             </a:r>
-            <a:endParaRPr lang="es-ES_tradnl" sz="2800" b="1" dirty="0">
-              <a:solidFill>
-                <a:schemeClr val="tx1">
-                  <a:lumMod val="65000"/>
-                  <a:lumOff val="35000"/>
-                </a:schemeClr>
-              </a:solidFill>
-              <a:latin typeface="Arial"/>
-              <a:cs typeface="Arial"/>
-            </a:endParaRPr>
           </a:p>
           <a:p>
             <a:pPr algn="ctr"/>
             <a:r>
-              <a:rPr lang="es-ES_tradnl" sz="2000" dirty="0" smtClean="0">
+              <a:rPr lang="es-ES_tradnl" sz="2000" dirty="0">
                 <a:solidFill>
                   <a:schemeClr val="accent2">
                     <a:lumMod val="75000"/>
@@ -2535,15 +2471,6 @@
               </a:rPr>
               <a:t>Efrain Adrian Luna Nevarez</a:t>
             </a:r>
-            <a:endParaRPr lang="es-ES_tradnl" sz="2000" dirty="0">
-              <a:solidFill>
-                <a:schemeClr val="accent2">
-                  <a:lumMod val="75000"/>
-                </a:schemeClr>
-              </a:solidFill>
-              <a:latin typeface="Arial"/>
-              <a:cs typeface="Arial"/>
-            </a:endParaRPr>
           </a:p>
         </p:txBody>
       </p:sp>
@@ -2632,7 +2559,7 @@
           <a:lstStyle/>
           <a:p>
             <a:r>
-              <a:rPr lang="es-ES_tradnl" sz="2000" b="1" dirty="0" smtClean="0">
+              <a:rPr lang="es-ES_tradnl" sz="2000" b="1" dirty="0">
                 <a:solidFill>
                   <a:schemeClr val="accent2">
                     <a:lumMod val="75000"/>
@@ -2643,15 +2570,6 @@
               </a:rPr>
               <a:t>Formato MIDI</a:t>
             </a:r>
-            <a:endParaRPr lang="es-ES_tradnl" sz="2000" b="1" dirty="0">
-              <a:solidFill>
-                <a:schemeClr val="accent2">
-                  <a:lumMod val="75000"/>
-                </a:schemeClr>
-              </a:solidFill>
-              <a:latin typeface="Arial"/>
-              <a:cs typeface="Arial"/>
-            </a:endParaRPr>
           </a:p>
           <a:p>
             <a:endParaRPr lang="es-ES_tradnl" dirty="0">
@@ -2703,7 +2621,7 @@
           <a:blip r:embed="rId3">
             <a:extLst>
               <a:ext uri="{28A0092B-C50C-407E-A947-70E740481C1C}">
-                <a14:useLocalDpi xmlns:a14="http://schemas.microsoft.com/office/drawing/2010/main" xmlns="" val="0"/>
+                <a14:useLocalDpi xmlns:a14="http://schemas.microsoft.com/office/drawing/2010/main" val="0"/>
               </a:ext>
             </a:extLst>
           </a:blip>
@@ -2723,7 +2641,7 @@
           <a:noFill/>
           <a:extLst>
             <a:ext uri="{909E8E84-426E-40DD-AFC4-6F175D3DCCD1}">
-              <a14:hiddenFill xmlns:a14="http://schemas.microsoft.com/office/drawing/2010/main" xmlns="">
+              <a14:hiddenFill xmlns:a14="http://schemas.microsoft.com/office/drawing/2010/main">
                 <a:solidFill>
                   <a:srgbClr val="FFFFFF"/>
                 </a:solidFill>
@@ -2744,7 +2662,7 @@
           <a:blip r:embed="rId4">
             <a:extLst>
               <a:ext uri="{28A0092B-C50C-407E-A947-70E740481C1C}">
-                <a14:useLocalDpi xmlns:a14="http://schemas.microsoft.com/office/drawing/2010/main" xmlns="" val="0"/>
+                <a14:useLocalDpi xmlns:a14="http://schemas.microsoft.com/office/drawing/2010/main" val="0"/>
               </a:ext>
             </a:extLst>
           </a:blip>
@@ -2762,7 +2680,7 @@
           <a:noFill/>
           <a:extLst>
             <a:ext uri="{909E8E84-426E-40DD-AFC4-6F175D3DCCD1}">
-              <a14:hiddenFill xmlns:a14="http://schemas.microsoft.com/office/drawing/2010/main" xmlns="">
+              <a14:hiddenFill xmlns:a14="http://schemas.microsoft.com/office/drawing/2010/main">
                 <a:solidFill>
                   <a:srgbClr val="FFFFFF"/>
                 </a:solidFill>
@@ -2807,7 +2725,7 @@
     </p:spTree>
     <p:extLst>
       <p:ext uri="{BB962C8B-B14F-4D97-AF65-F5344CB8AC3E}">
-        <p14:creationId xmlns:p14="http://schemas.microsoft.com/office/powerpoint/2010/main" xmlns="" val="3611779954"/>
+        <p14:creationId xmlns:p14="http://schemas.microsoft.com/office/powerpoint/2010/main" val="3611779954"/>
       </p:ext>
     </p:extLst>
   </p:cSld>
@@ -2894,7 +2812,7 @@
           <a:lstStyle/>
           <a:p>
             <a:r>
-              <a:rPr lang="es-ES_tradnl" dirty="0" smtClean="0">
+              <a:rPr lang="es-ES_tradnl" dirty="0">
                 <a:solidFill>
                   <a:schemeClr val="tx1">
                     <a:lumMod val="65000"/>
@@ -2907,7 +2825,7 @@
               <a:t>Este proyecto consta de 3 </a:t>
             </a:r>
             <a:r>
-              <a:rPr lang="es-ES_tradnl" dirty="0" err="1" smtClean="0">
+              <a:rPr lang="es-ES_tradnl" dirty="0" err="1">
                 <a:solidFill>
                   <a:schemeClr val="tx1">
                     <a:lumMod val="65000"/>
@@ -2920,7 +2838,7 @@
               <a:t>modulos</a:t>
             </a:r>
             <a:r>
-              <a:rPr lang="es-ES_tradnl" dirty="0" smtClean="0">
+              <a:rPr lang="es-ES_tradnl" dirty="0">
                 <a:solidFill>
                   <a:schemeClr val="tx1">
                     <a:lumMod val="65000"/>
@@ -2951,7 +2869,7 @@
               <a:buChar char="-"/>
             </a:pPr>
             <a:r>
-              <a:rPr lang="es-ES_tradnl" b="1" dirty="0" err="1" smtClean="0">
+              <a:rPr lang="es-ES_tradnl" b="1" dirty="0" err="1">
                 <a:solidFill>
                   <a:schemeClr val="tx1">
                     <a:lumMod val="65000"/>
@@ -2964,7 +2882,7 @@
               <a:t>Preprocesamiento</a:t>
             </a:r>
             <a:r>
-              <a:rPr lang="es-ES_tradnl" b="1" dirty="0" smtClean="0">
+              <a:rPr lang="es-ES_tradnl" b="1" dirty="0">
                 <a:solidFill>
                   <a:schemeClr val="tx1">
                     <a:lumMod val="65000"/>
@@ -2977,7 +2895,7 @@
               <a:t>.- </a:t>
             </a:r>
             <a:r>
-              <a:rPr lang="es-ES_tradnl" dirty="0" smtClean="0">
+              <a:rPr lang="es-ES_tradnl" dirty="0">
                 <a:solidFill>
                   <a:schemeClr val="tx1">
                     <a:lumMod val="65000"/>
@@ -2990,7 +2908,7 @@
               <a:t>Aquí se procesa los archivos MIDI para extraer únicamente los </a:t>
             </a:r>
             <a:r>
-              <a:rPr lang="es-ES_tradnl" dirty="0" err="1" smtClean="0">
+              <a:rPr lang="es-ES_tradnl" dirty="0" err="1">
                 <a:solidFill>
                   <a:schemeClr val="tx1">
                     <a:lumMod val="65000"/>
@@ -3003,7 +2921,7 @@
               <a:t>tracks</a:t>
             </a:r>
             <a:r>
-              <a:rPr lang="es-ES_tradnl" dirty="0" smtClean="0">
+              <a:rPr lang="es-ES_tradnl" dirty="0">
                 <a:solidFill>
                   <a:schemeClr val="tx1">
                     <a:lumMod val="65000"/>
@@ -3016,7 +2934,7 @@
               <a:t> de Guitarra, Bajo y </a:t>
             </a:r>
             <a:r>
-              <a:rPr lang="es-ES_tradnl" dirty="0" err="1" smtClean="0">
+              <a:rPr lang="es-ES_tradnl" dirty="0" err="1">
                 <a:solidFill>
                   <a:schemeClr val="tx1">
                     <a:lumMod val="65000"/>
@@ -3029,7 +2947,7 @@
               <a:t>Bateria</a:t>
             </a:r>
             <a:r>
-              <a:rPr lang="es-ES_tradnl" dirty="0" smtClean="0">
+              <a:rPr lang="es-ES_tradnl" dirty="0">
                 <a:solidFill>
                   <a:schemeClr val="tx1">
                     <a:lumMod val="65000"/>
@@ -3048,7 +2966,7 @@
               <a:buChar char="-"/>
             </a:pPr>
             <a:r>
-              <a:rPr lang="es-ES_tradnl" b="1" dirty="0" smtClean="0">
+              <a:rPr lang="es-ES_tradnl" b="1" dirty="0">
                 <a:solidFill>
                   <a:schemeClr val="tx1">
                     <a:lumMod val="65000"/>
@@ -3061,7 +2979,7 @@
               <a:t>Entrenamiento.- </a:t>
             </a:r>
             <a:r>
-              <a:rPr lang="es-ES_tradnl" dirty="0" smtClean="0">
+              <a:rPr lang="es-ES_tradnl" dirty="0">
                 <a:solidFill>
                   <a:schemeClr val="tx1">
                     <a:lumMod val="65000"/>
@@ -3074,7 +2992,7 @@
               <a:t>Este modulo se encarga de entrenar la red con los archivos previamente </a:t>
             </a:r>
             <a:r>
-              <a:rPr lang="es-ES_tradnl" dirty="0" err="1" smtClean="0">
+              <a:rPr lang="es-ES_tradnl" dirty="0" err="1">
                 <a:solidFill>
                   <a:schemeClr val="tx1">
                     <a:lumMod val="65000"/>
@@ -3087,7 +3005,7 @@
               <a:t>preprocesados</a:t>
             </a:r>
             <a:r>
-              <a:rPr lang="es-ES_tradnl" dirty="0" smtClean="0">
+              <a:rPr lang="es-ES_tradnl" dirty="0">
                 <a:solidFill>
                   <a:schemeClr val="tx1">
                     <a:lumMod val="65000"/>
@@ -3106,7 +3024,7 @@
               <a:buChar char="-"/>
             </a:pPr>
             <a:r>
-              <a:rPr lang="es-ES_tradnl" b="1" dirty="0" err="1" smtClean="0">
+              <a:rPr lang="es-ES_tradnl" b="1" dirty="0" err="1">
                 <a:solidFill>
                   <a:schemeClr val="tx1">
                     <a:lumMod val="65000"/>
@@ -3119,7 +3037,7 @@
               <a:t>Generacion</a:t>
             </a:r>
             <a:r>
-              <a:rPr lang="es-ES_tradnl" b="1" dirty="0" smtClean="0">
+              <a:rPr lang="es-ES_tradnl" b="1" dirty="0">
                 <a:solidFill>
                   <a:schemeClr val="tx1">
                     <a:lumMod val="65000"/>
@@ -3132,7 +3050,7 @@
               <a:t>.- </a:t>
             </a:r>
             <a:r>
-              <a:rPr lang="es-ES_tradnl" dirty="0" smtClean="0">
+              <a:rPr lang="es-ES_tradnl" dirty="0">
                 <a:solidFill>
                   <a:schemeClr val="tx1">
                     <a:lumMod val="65000"/>
@@ -3150,7 +3068,7 @@
               <a:buFontTx/>
               <a:buChar char="-"/>
             </a:pPr>
-            <a:endParaRPr lang="es-ES_tradnl" dirty="0" smtClean="0">
+            <a:endParaRPr lang="es-ES_tradnl" dirty="0">
               <a:solidFill>
                 <a:schemeClr val="tx1">
                   <a:lumMod val="65000"/>
@@ -3206,7 +3124,7 @@
     </p:spTree>
     <p:extLst>
       <p:ext uri="{BB962C8B-B14F-4D97-AF65-F5344CB8AC3E}">
-        <p14:creationId xmlns:p14="http://schemas.microsoft.com/office/powerpoint/2010/main" xmlns="" val="964733070"/>
+        <p14:creationId xmlns:p14="http://schemas.microsoft.com/office/powerpoint/2010/main" val="964733070"/>
       </p:ext>
     </p:extLst>
   </p:cSld>
@@ -3293,7 +3211,7 @@
           <a:lstStyle/>
           <a:p>
             <a:r>
-              <a:rPr lang="es-ES_tradnl" dirty="0" smtClean="0">
+              <a:rPr lang="es-ES_tradnl" dirty="0">
                 <a:solidFill>
                   <a:schemeClr val="tx1">
                     <a:lumMod val="65000"/>
@@ -3306,7 +3224,7 @@
               <a:t>El </a:t>
             </a:r>
             <a:r>
-              <a:rPr lang="es-ES_tradnl" dirty="0" err="1" smtClean="0">
+              <a:rPr lang="es-ES_tradnl" dirty="0" err="1">
                 <a:solidFill>
                   <a:schemeClr val="tx1">
                     <a:lumMod val="65000"/>
@@ -3319,7 +3237,7 @@
               <a:t>dataset</a:t>
             </a:r>
             <a:r>
-              <a:rPr lang="es-ES_tradnl" dirty="0" smtClean="0">
+              <a:rPr lang="es-ES_tradnl" dirty="0">
                 <a:solidFill>
                   <a:schemeClr val="tx1">
                     <a:lumMod val="65000"/>
@@ -3333,41 +3251,36 @@
             </a:r>
           </a:p>
           <a:p>
-            <a:endParaRPr lang="es-MX" dirty="0" smtClean="0"/>
-          </a:p>
-          <a:p>
-            <a:r>
-              <a:rPr lang="es-MX" dirty="0" smtClean="0"/>
+            <a:endParaRPr lang="es-MX" dirty="0"/>
+          </a:p>
+          <a:p>
+            <a:r>
+              <a:rPr lang="es-MX" dirty="0"/>
               <a:t>“</a:t>
             </a:r>
             <a:r>
-              <a:rPr lang="es-MX" dirty="0" err="1" smtClean="0"/>
+              <a:rPr lang="es-MX" dirty="0" err="1"/>
               <a:t>Clean</a:t>
             </a:r>
             <a:r>
-              <a:rPr lang="es-MX" dirty="0" smtClean="0"/>
-              <a:t> </a:t>
-            </a:r>
-            <a:r>
               <a:rPr lang="es-MX" dirty="0"/>
-              <a:t>MIDI </a:t>
-            </a:r>
-            <a:r>
-              <a:rPr lang="es-MX" dirty="0" err="1" smtClean="0"/>
+              <a:t> MIDI </a:t>
+            </a:r>
+            <a:r>
+              <a:rPr lang="es-MX" dirty="0" err="1"/>
               <a:t>subset</a:t>
             </a:r>
             <a:r>
-              <a:rPr lang="es-MX" dirty="0" smtClean="0"/>
+              <a:rPr lang="es-MX" dirty="0"/>
               <a:t>”</a:t>
             </a:r>
+          </a:p>
+          <a:p>
             <a:endParaRPr lang="es-MX" dirty="0"/>
           </a:p>
           <a:p>
-            <a:endParaRPr lang="es-MX" dirty="0" smtClean="0"/>
-          </a:p>
-          <a:p>
-            <a:r>
-              <a:rPr lang="es-ES_tradnl" dirty="0" smtClean="0">
+            <a:r>
+              <a:rPr lang="es-ES_tradnl" dirty="0">
                 <a:solidFill>
                   <a:schemeClr val="tx1">
                     <a:lumMod val="65000"/>
@@ -3405,34 +3318,8 @@
                 <a:cs typeface="Arial"/>
                 <a:hlinkClick r:id="rId2"/>
               </a:rPr>
-              <a:t>http://</a:t>
-            </a:r>
-            <a:r>
-              <a:rPr lang="es-ES_tradnl" dirty="0" smtClean="0">
-                <a:solidFill>
-                  <a:schemeClr val="tx1">
-                    <a:lumMod val="65000"/>
-                    <a:lumOff val="35000"/>
-                  </a:schemeClr>
-                </a:solidFill>
-                <a:latin typeface="Arial"/>
-                <a:cs typeface="Arial"/>
-                <a:hlinkClick r:id="rId2"/>
-              </a:rPr>
-              <a:t>hog.ee.columbia.edu/craffel/lmd/clean_midi.tar.gz</a:t>
-            </a:r>
-            <a:endParaRPr lang="es-ES_tradnl" dirty="0" smtClean="0">
-              <a:solidFill>
-                <a:schemeClr val="tx1">
-                  <a:lumMod val="65000"/>
-                  <a:lumOff val="35000"/>
-                </a:schemeClr>
-              </a:solidFill>
-              <a:latin typeface="Arial"/>
-              <a:cs typeface="Arial"/>
-            </a:endParaRPr>
-          </a:p>
-          <a:p>
+              <a:t>http://hog.ee.columbia.edu/craffel/lmd/clean_midi.tar.gz</a:t>
+            </a:r>
             <a:endParaRPr lang="es-ES_tradnl" dirty="0">
               <a:solidFill>
                 <a:schemeClr val="tx1">
@@ -3445,8 +3332,20 @@
             </a:endParaRPr>
           </a:p>
           <a:p>
-            <a:r>
-              <a:rPr lang="es-ES_tradnl" dirty="0" smtClean="0">
+            <a:endParaRPr lang="es-ES_tradnl" dirty="0">
+              <a:solidFill>
+                <a:schemeClr val="tx1">
+                  <a:lumMod val="65000"/>
+                  <a:lumOff val="35000"/>
+                </a:schemeClr>
+              </a:solidFill>
+              <a:latin typeface="Arial"/>
+              <a:cs typeface="Arial"/>
+            </a:endParaRPr>
+          </a:p>
+          <a:p>
+            <a:r>
+              <a:rPr lang="es-ES_tradnl" dirty="0">
                 <a:solidFill>
                   <a:schemeClr val="tx1">
                     <a:lumMod val="65000"/>
@@ -3459,7 +3358,7 @@
               <a:t>Este </a:t>
             </a:r>
             <a:r>
-              <a:rPr lang="es-ES_tradnl" dirty="0" err="1" smtClean="0">
+              <a:rPr lang="es-ES_tradnl" dirty="0" err="1">
                 <a:solidFill>
                   <a:schemeClr val="tx1">
                     <a:lumMod val="65000"/>
@@ -3472,7 +3371,7 @@
               <a:t>dataset</a:t>
             </a:r>
             <a:r>
-              <a:rPr lang="es-ES_tradnl" dirty="0" smtClean="0">
+              <a:rPr lang="es-ES_tradnl" dirty="0">
                 <a:solidFill>
                   <a:schemeClr val="tx1">
                     <a:lumMod val="65000"/>
@@ -3485,7 +3384,7 @@
               <a:t> contiene mas de 17000 canciones MIDI de rock y pop, ha sido utilizado en varios proyecto de Deep </a:t>
             </a:r>
             <a:r>
-              <a:rPr lang="es-ES_tradnl" dirty="0" err="1" smtClean="0">
+              <a:rPr lang="es-ES_tradnl" dirty="0" err="1">
                 <a:solidFill>
                   <a:schemeClr val="tx1">
                     <a:lumMod val="65000"/>
@@ -3498,7 +3397,7 @@
               <a:t>Learning</a:t>
             </a:r>
             <a:r>
-              <a:rPr lang="es-ES_tradnl" dirty="0" smtClean="0">
+              <a:rPr lang="es-ES_tradnl" dirty="0">
                 <a:solidFill>
                   <a:schemeClr val="tx1">
                     <a:lumMod val="65000"/>
@@ -3549,7 +3448,7 @@
           <a:blip r:embed="rId3">
             <a:extLst>
               <a:ext uri="{28A0092B-C50C-407E-A947-70E740481C1C}">
-                <a14:useLocalDpi xmlns:a14="http://schemas.microsoft.com/office/drawing/2010/main" xmlns="" val="0"/>
+                <a14:useLocalDpi xmlns:a14="http://schemas.microsoft.com/office/drawing/2010/main" val="0"/>
               </a:ext>
             </a:extLst>
           </a:blip>
@@ -3569,7 +3468,7 @@
           <a:noFill/>
           <a:extLst>
             <a:ext uri="{909E8E84-426E-40DD-AFC4-6F175D3DCCD1}">
-              <a14:hiddenFill xmlns:a14="http://schemas.microsoft.com/office/drawing/2010/main" xmlns="">
+              <a14:hiddenFill xmlns:a14="http://schemas.microsoft.com/office/drawing/2010/main">
                 <a:solidFill>
                   <a:srgbClr val="FFFFFF"/>
                 </a:solidFill>
@@ -3581,7 +3480,7 @@
     </p:spTree>
     <p:extLst>
       <p:ext uri="{BB962C8B-B14F-4D97-AF65-F5344CB8AC3E}">
-        <p14:creationId xmlns:p14="http://schemas.microsoft.com/office/powerpoint/2010/main" xmlns="" val="961381293"/>
+        <p14:creationId xmlns:p14="http://schemas.microsoft.com/office/powerpoint/2010/main" val="961381293"/>
       </p:ext>
     </p:extLst>
   </p:cSld>
@@ -3668,7 +3567,7 @@
           <a:lstStyle/>
           <a:p>
             <a:r>
-              <a:rPr lang="es-ES_tradnl" dirty="0" smtClean="0">
+              <a:rPr lang="es-ES_tradnl" dirty="0">
                 <a:solidFill>
                   <a:schemeClr val="tx1">
                     <a:lumMod val="65000"/>
@@ -3681,7 +3580,7 @@
               <a:t>Se utilizo un optimizador </a:t>
             </a:r>
             <a:r>
-              <a:rPr lang="es-ES_tradnl" dirty="0" err="1" smtClean="0">
+              <a:rPr lang="es-ES_tradnl" dirty="0" err="1">
                 <a:solidFill>
                   <a:schemeClr val="tx1">
                     <a:lumMod val="65000"/>
@@ -3694,7 +3593,7 @@
               <a:t>Rmsprop</a:t>
             </a:r>
             <a:r>
-              <a:rPr lang="es-ES_tradnl" dirty="0" smtClean="0">
+              <a:rPr lang="es-ES_tradnl" dirty="0">
                 <a:solidFill>
                   <a:schemeClr val="tx1">
                     <a:lumMod val="65000"/>
@@ -3752,7 +3651,7 @@
     </p:spTree>
     <p:extLst>
       <p:ext uri="{BB962C8B-B14F-4D97-AF65-F5344CB8AC3E}">
-        <p14:creationId xmlns:p14="http://schemas.microsoft.com/office/powerpoint/2010/main" xmlns="" val="3661972963"/>
+        <p14:creationId xmlns:p14="http://schemas.microsoft.com/office/powerpoint/2010/main" val="3661972963"/>
       </p:ext>
     </p:extLst>
   </p:cSld>
@@ -3843,7 +3742,7 @@
     </p:spTree>
     <p:extLst>
       <p:ext uri="{BB962C8B-B14F-4D97-AF65-F5344CB8AC3E}">
-        <p14:creationId xmlns:p14="http://schemas.microsoft.com/office/powerpoint/2010/main" xmlns="" val="2927349331"/>
+        <p14:creationId xmlns:p14="http://schemas.microsoft.com/office/powerpoint/2010/main" val="2927349331"/>
       </p:ext>
     </p:extLst>
   </p:cSld>
@@ -4002,10 +3901,9 @@
           <a:lstStyle/>
           <a:p>
             <a:r>
-              <a:rPr lang="es-MX" dirty="0" smtClean="0"/>
+              <a:rPr lang="es-MX" dirty="0"/>
               <a:t>Salida de Guitarra</a:t>
             </a:r>
-            <a:endParaRPr lang="es-MX" dirty="0"/>
           </a:p>
         </p:txBody>
       </p:sp>
@@ -4032,10 +3930,9 @@
           <a:lstStyle/>
           <a:p>
             <a:r>
-              <a:rPr lang="es-MX" dirty="0" smtClean="0"/>
+              <a:rPr lang="es-MX" dirty="0"/>
               <a:t>Salida de Bajo</a:t>
             </a:r>
-            <a:endParaRPr lang="es-MX" dirty="0"/>
           </a:p>
         </p:txBody>
       </p:sp>
@@ -4062,11 +3959,11 @@
           <a:lstStyle/>
           <a:p>
             <a:r>
-              <a:rPr lang="es-MX" dirty="0" smtClean="0"/>
+              <a:rPr lang="es-MX" dirty="0"/>
               <a:t>Salida de </a:t>
             </a:r>
             <a:r>
-              <a:rPr lang="es-MX" dirty="0" err="1" smtClean="0"/>
+              <a:rPr lang="es-MX" dirty="0" err="1"/>
               <a:t>Bateria</a:t>
             </a:r>
             <a:endParaRPr lang="es-MX" dirty="0"/>
@@ -4085,7 +3982,7 @@
           <a:blip r:embed="rId5">
             <a:extLst>
               <a:ext uri="{28A0092B-C50C-407E-A947-70E740481C1C}">
-                <a14:useLocalDpi xmlns:a14="http://schemas.microsoft.com/office/drawing/2010/main" xmlns="" val="0"/>
+                <a14:useLocalDpi xmlns:a14="http://schemas.microsoft.com/office/drawing/2010/main" val="0"/>
               </a:ext>
             </a:extLst>
           </a:blip>
@@ -4105,7 +4002,7 @@
           <a:noFill/>
           <a:extLst>
             <a:ext uri="{909E8E84-426E-40DD-AFC4-6F175D3DCCD1}">
-              <a14:hiddenFill xmlns:a14="http://schemas.microsoft.com/office/drawing/2010/main" xmlns="">
+              <a14:hiddenFill xmlns:a14="http://schemas.microsoft.com/office/drawing/2010/main">
                 <a:solidFill>
                   <a:srgbClr val="FFFFFF"/>
                 </a:solidFill>
@@ -4117,7 +4014,7 @@
     </p:spTree>
     <p:extLst>
       <p:ext uri="{BB962C8B-B14F-4D97-AF65-F5344CB8AC3E}">
-        <p14:creationId xmlns:p14="http://schemas.microsoft.com/office/powerpoint/2010/main" xmlns="" val="3141686425"/>
+        <p14:creationId xmlns:p14="http://schemas.microsoft.com/office/powerpoint/2010/main" val="3141686425"/>
       </p:ext>
     </p:extLst>
   </p:cSld>
@@ -4208,15 +4105,15 @@
               <a:buChar char="•"/>
             </a:pPr>
             <a:r>
-              <a:rPr lang="es-MX" dirty="0" smtClean="0"/>
+              <a:rPr lang="es-MX" dirty="0"/>
               <a:t>Los resultados obtenidos de este proyecto fueron bastante buenos, ya que la red fue capaz de aprender a generar notas y silencios de diferentes valores, </a:t>
             </a:r>
             <a:r>
-              <a:rPr lang="es-MX" dirty="0" err="1" smtClean="0"/>
+              <a:rPr lang="es-MX" dirty="0" err="1"/>
               <a:t>asi</a:t>
             </a:r>
             <a:r>
-              <a:rPr lang="es-MX" dirty="0" smtClean="0"/>
+              <a:rPr lang="es-MX" dirty="0"/>
               <a:t> como su conjunción en una melodía.</a:t>
             </a:r>
           </a:p>
@@ -4226,42 +4123,9 @@
               <a:buChar char="•"/>
             </a:pPr>
             <a:r>
-              <a:rPr lang="es-MX" dirty="0" smtClean="0"/>
-              <a:t>Este </a:t>
-            </a:r>
-            <a:r>
               <a:rPr lang="es-MX" dirty="0"/>
-              <a:t>proyecto sirve para reflexionar acerca de las </a:t>
-            </a:r>
-            <a:r>
-              <a:rPr lang="es-MX" dirty="0" smtClean="0"/>
-              <a:t>redes recurrentes</a:t>
-            </a:r>
-            <a:r>
-              <a:rPr lang="es-MX" dirty="0"/>
-              <a:t>, a pesar de ser una herramienta muy potente </a:t>
-            </a:r>
-            <a:r>
-              <a:rPr lang="es-MX" dirty="0" smtClean="0"/>
-              <a:t>a la </a:t>
-            </a:r>
-            <a:r>
-              <a:rPr lang="es-MX" dirty="0"/>
-              <a:t>hora de emplearlas en diferentes problemas, la realidad </a:t>
-            </a:r>
-            <a:r>
-              <a:rPr lang="es-MX" dirty="0" smtClean="0"/>
-              <a:t>es que </a:t>
-            </a:r>
-            <a:r>
-              <a:rPr lang="es-MX" dirty="0"/>
-              <a:t>el tiempo de procesamiento de estas redes es </a:t>
-            </a:r>
-            <a:r>
-              <a:rPr lang="es-MX" dirty="0" smtClean="0"/>
-              <a:t>considerable.</a:t>
-            </a:r>
-            <a:endParaRPr lang="es-MX" dirty="0"/>
+              <a:t>Este proyecto sirve para reflexionar acerca de las redes recurrentes, a pesar de ser una herramienta muy potente a la hora de emplearlas en diferentes problemas, la realidad es que el tiempo de procesamiento de estas redes es considerable.</a:t>
+            </a:r>
           </a:p>
           <a:p>
             <a:pPr marL="285750" indent="-285750">
@@ -4270,15 +4134,7 @@
             </a:pPr>
             <a:r>
               <a:rPr lang="es-MX" dirty="0"/>
-              <a:t>Posiblemente en un futuro el poder de procesamiento </a:t>
-            </a:r>
-            <a:r>
-              <a:rPr lang="es-MX" dirty="0" smtClean="0"/>
-              <a:t>nos permita </a:t>
-            </a:r>
-            <a:r>
-              <a:rPr lang="es-MX" dirty="0"/>
-              <a:t>seguir experimentando con estas redes.</a:t>
+              <a:t>Posiblemente en un futuro el poder de procesamiento nos permita seguir experimentando con estas redes.</a:t>
             </a:r>
           </a:p>
           <a:p>
@@ -4287,52 +4143,16 @@
               <a:buChar char="•"/>
             </a:pPr>
             <a:r>
-              <a:rPr lang="es-MX" dirty="0" smtClean="0"/>
-              <a:t>La intención </a:t>
-            </a:r>
-            <a:r>
               <a:rPr lang="es-MX" dirty="0"/>
-              <a:t>de </a:t>
-            </a:r>
-            <a:r>
-              <a:rPr lang="es-MX" dirty="0" smtClean="0"/>
-              <a:t>este proyecto </a:t>
+              <a:t>La intención de este proyecto no era generar una </a:t>
+            </a:r>
+            <a:r>
+              <a:rPr lang="es-MX" dirty="0" err="1"/>
+              <a:t>musica</a:t>
             </a:r>
             <a:r>
               <a:rPr lang="es-MX" dirty="0"/>
-              <a:t>no era generar una </a:t>
-            </a:r>
-            <a:r>
-              <a:rPr lang="es-MX" dirty="0" err="1" smtClean="0"/>
-              <a:t>musica</a:t>
-            </a:r>
-            <a:r>
-              <a:rPr lang="es-MX" dirty="0" smtClean="0"/>
-              <a:t> exitosa, sino </a:t>
-            </a:r>
-            <a:r>
-              <a:rPr lang="es-MX" dirty="0"/>
-              <a:t>darle una idea de </a:t>
-            </a:r>
-            <a:r>
-              <a:rPr lang="es-MX" dirty="0" smtClean="0"/>
-              <a:t>composición </a:t>
-            </a:r>
-            <a:r>
-              <a:rPr lang="es-MX" dirty="0"/>
-              <a:t>al </a:t>
-            </a:r>
-            <a:r>
-              <a:rPr lang="es-MX" dirty="0" smtClean="0"/>
-              <a:t>músico</a:t>
-            </a:r>
-            <a:r>
-              <a:rPr lang="es-MX" dirty="0"/>
-              <a:t>, el cual </a:t>
-            </a:r>
-            <a:r>
-              <a:rPr lang="es-MX" dirty="0" smtClean="0"/>
-              <a:t>va a decidir si empleara las notas generadas o cambiara algunas de ellas.</a:t>
+              <a:t> exitosa, sino darle una idea de composición al músico, el cual va a decidir si empleara las notas generadas o cambiara algunas de ellas.</a:t>
             </a:r>
             <a:endParaRPr lang="es-ES_tradnl" dirty="0">
               <a:solidFill>
@@ -4350,7 +4170,7 @@
     </p:spTree>
     <p:extLst>
       <p:ext uri="{BB962C8B-B14F-4D97-AF65-F5344CB8AC3E}">
-        <p14:creationId xmlns:p14="http://schemas.microsoft.com/office/powerpoint/2010/main" xmlns="" val="2630158223"/>
+        <p14:creationId xmlns:p14="http://schemas.microsoft.com/office/powerpoint/2010/main" val="2630158223"/>
       </p:ext>
     </p:extLst>
   </p:cSld>
@@ -4664,17 +4484,17 @@
               <a:t> </a:t>
             </a:r>
             <a:r>
-              <a:rPr lang="es-ES" i="1" dirty="0" err="1" smtClean="0"/>
+              <a:rPr lang="es-ES" i="1" dirty="0" err="1"/>
               <a:t>Theory</a:t>
             </a:r>
             <a:r>
-              <a:rPr lang="es-ES" i="1" dirty="0" smtClean="0"/>
+              <a:rPr lang="es-ES" i="1" dirty="0"/>
               <a:t>“</a:t>
             </a:r>
           </a:p>
           <a:p>
             <a:r>
-              <a:rPr lang="es-MX" i="1" dirty="0" smtClean="0"/>
+              <a:rPr lang="es-MX" i="1" dirty="0"/>
               <a:t>[7] </a:t>
             </a:r>
             <a:r>
@@ -4695,19 +4515,11 @@
             </a:r>
             <a:r>
               <a:rPr lang="en-US" i="1" dirty="0"/>
-              <a:t> </a:t>
-            </a:r>
-            <a:r>
-              <a:rPr lang="en-US" i="1" dirty="0" smtClean="0"/>
-              <a:t>(</a:t>
-            </a:r>
-            <a:r>
-              <a:rPr lang="es-MX" i="1" dirty="0" smtClean="0"/>
-              <a:t>2002), </a:t>
+              <a:t> (</a:t>
             </a:r>
             <a:r>
               <a:rPr lang="es-MX" i="1" dirty="0"/>
-              <a:t>“</a:t>
+              <a:t>2002), “</a:t>
             </a:r>
             <a:r>
               <a:rPr lang="en-US" i="1" dirty="0"/>
@@ -4723,21 +4535,17 @@
             </a:r>
             <a:r>
               <a:rPr lang="es-MX" i="1" dirty="0"/>
-              <a:t>02</a:t>
-            </a:r>
-            <a:r>
-              <a:rPr lang="es-MX" i="1" dirty="0" smtClean="0"/>
-              <a:t>”</a:t>
-            </a:r>
-            <a:r>
-              <a:rPr lang="en-US" i="1" dirty="0" smtClean="0"/>
+              <a:t>02”</a:t>
+            </a:r>
+            <a:r>
+              <a:rPr lang="en-US" i="1" dirty="0"/>
               <a:t> </a:t>
             </a:r>
             <a:endParaRPr lang="es-MX" i="1" dirty="0"/>
           </a:p>
           <a:p>
             <a:r>
-              <a:rPr lang="es-ES" i="1" dirty="0" smtClean="0"/>
+              <a:rPr lang="es-ES" i="1" dirty="0"/>
               <a:t>[8] </a:t>
             </a:r>
             <a:r>
@@ -4780,12 +4588,8 @@
           </a:p>
           <a:p>
             <a:r>
-              <a:rPr lang="es-ES" i="1" dirty="0" smtClean="0"/>
-              <a:t>(2009), </a:t>
-            </a:r>
-            <a:r>
               <a:rPr lang="es-ES" i="1" dirty="0"/>
-              <a:t>“</a:t>
+              <a:t>(2009), “</a:t>
             </a:r>
             <a:r>
               <a:rPr lang="es-ES" i="1" dirty="0" err="1"/>
@@ -4864,7 +4668,7 @@
               <a:t>networks</a:t>
             </a:r>
             <a:r>
-              <a:rPr lang="es-ES" i="1" dirty="0" smtClean="0"/>
+              <a:rPr lang="es-ES" i="1" dirty="0"/>
               <a:t>”</a:t>
             </a:r>
             <a:endParaRPr lang="es-ES_tradnl" i="1" dirty="0">
@@ -4879,15 +4683,15 @@
           </a:p>
           <a:p>
             <a:r>
-              <a:rPr lang="es-ES" i="1" dirty="0" smtClean="0"/>
+              <a:rPr lang="es-ES" i="1" dirty="0"/>
               <a:t>[9] </a:t>
             </a:r>
             <a:r>
-              <a:rPr lang="es-ES" i="1" dirty="0" err="1" smtClean="0"/>
+              <a:rPr lang="es-ES" i="1" dirty="0" err="1"/>
               <a:t>Aggelos</a:t>
             </a:r>
             <a:r>
-              <a:rPr lang="es-ES" i="1" dirty="0" smtClean="0"/>
+              <a:rPr lang="es-ES" i="1" dirty="0"/>
               <a:t> </a:t>
             </a:r>
             <a:r>
@@ -4896,15 +4700,7 @@
             </a:r>
             <a:r>
               <a:rPr lang="es-ES" i="1" dirty="0"/>
-              <a:t> </a:t>
-            </a:r>
-            <a:r>
-              <a:rPr lang="es-ES" i="1" dirty="0" smtClean="0"/>
-              <a:t>(2013), </a:t>
-            </a:r>
-            <a:r>
-              <a:rPr lang="es-ES" i="1" dirty="0"/>
-              <a:t>"A Deep </a:t>
+              <a:t> (2013), "A Deep </a:t>
             </a:r>
             <a:r>
               <a:rPr lang="es-ES" i="1" dirty="0" err="1"/>
@@ -4951,14 +4747,14 @@
               <a:t>Applications</a:t>
             </a:r>
             <a:r>
-              <a:rPr lang="es-ES" i="1" dirty="0" smtClean="0"/>
+              <a:rPr lang="es-ES" i="1" dirty="0"/>
               <a:t>"</a:t>
             </a:r>
             <a:endParaRPr lang="es-MX" i="1" dirty="0"/>
           </a:p>
           <a:p>
             <a:r>
-              <a:rPr lang="es-ES" i="1" dirty="0" smtClean="0"/>
+              <a:rPr lang="es-ES" i="1" dirty="0"/>
               <a:t>[10] Allen </a:t>
             </a:r>
             <a:r>
@@ -4978,20 +4774,16 @@
               <a:t> </a:t>
             </a:r>
             <a:r>
-              <a:rPr lang="es-ES" i="1" dirty="0" err="1" smtClean="0"/>
+              <a:rPr lang="es-ES" i="1" dirty="0" err="1"/>
               <a:t>Wu</a:t>
             </a:r>
             <a:r>
-              <a:rPr lang="es-MX" i="1" dirty="0" smtClean="0"/>
+              <a:rPr lang="es-MX" i="1" dirty="0"/>
               <a:t> </a:t>
             </a:r>
             <a:r>
-              <a:rPr lang="es-ES" i="1" dirty="0" smtClean="0"/>
-              <a:t>(2016), </a:t>
-            </a:r>
-            <a:r>
               <a:rPr lang="es-ES" i="1" dirty="0"/>
-              <a:t>“Deep </a:t>
+              <a:t>(2016), “Deep </a:t>
             </a:r>
             <a:r>
               <a:rPr lang="es-ES" i="1" dirty="0" err="1"/>
@@ -5014,7 +4806,7 @@
               <a:t>Music</a:t>
             </a:r>
             <a:r>
-              <a:rPr lang="es-ES" i="1" dirty="0" smtClean="0"/>
+              <a:rPr lang="es-ES" i="1" dirty="0"/>
               <a:t>”</a:t>
             </a:r>
             <a:endParaRPr lang="es-MX" i="1" dirty="0"/>
@@ -5036,7 +4828,7 @@
     </p:spTree>
     <p:extLst>
       <p:ext uri="{BB962C8B-B14F-4D97-AF65-F5344CB8AC3E}">
-        <p14:creationId xmlns:p14="http://schemas.microsoft.com/office/powerpoint/2010/main" xmlns="" val="209157691"/>
+        <p14:creationId xmlns:p14="http://schemas.microsoft.com/office/powerpoint/2010/main" val="209157691"/>
       </p:ext>
     </p:extLst>
   </p:cSld>
@@ -5157,8 +4949,8 @@
         </p:nvSpPr>
         <p:spPr>
           <a:xfrm>
-            <a:off x="457200" y="1371600"/>
-            <a:ext cx="5029200" cy="3693319"/>
+            <a:off x="264367" y="2110264"/>
+            <a:ext cx="5029200" cy="1477328"/>
           </a:xfrm>
           <a:prstGeom prst="rect">
             <a:avLst/>
@@ -5172,151 +4964,19 @@
           <a:lstStyle/>
           <a:p>
             <a:r>
-              <a:rPr lang="es-MX" dirty="0" smtClean="0">
+              <a:rPr lang="es-MX" dirty="0">
                 <a:latin typeface="+mj-lt"/>
               </a:rPr>
-              <a:t>El tiempo que tarda una persona para componer una </a:t>
-            </a:r>
-            <a:r>
-              <a:rPr lang="es-MX" dirty="0" err="1" smtClean="0">
-                <a:latin typeface="+mj-lt"/>
-              </a:rPr>
-              <a:t>cancion</a:t>
-            </a:r>
-            <a:r>
-              <a:rPr lang="es-MX" dirty="0" smtClean="0">
-                <a:latin typeface="+mj-lt"/>
-              </a:rPr>
-              <a:t> puede variar, puede ser desde unas horas hasta varios </a:t>
-            </a:r>
-            <a:r>
-              <a:rPr lang="es-MX" dirty="0" err="1" smtClean="0">
-                <a:latin typeface="+mj-lt"/>
-              </a:rPr>
-              <a:t>dias</a:t>
-            </a:r>
-            <a:r>
-              <a:rPr lang="es-MX" dirty="0" smtClean="0">
-                <a:latin typeface="+mj-lt"/>
-              </a:rPr>
-              <a:t> o meses. Este tiempo depende de si ya se tiene una idea clara de la </a:t>
-            </a:r>
-            <a:r>
-              <a:rPr lang="es-MX" dirty="0" err="1" smtClean="0">
-                <a:latin typeface="+mj-lt"/>
-              </a:rPr>
-              <a:t>cancion</a:t>
-            </a:r>
-            <a:r>
-              <a:rPr lang="es-MX" dirty="0" smtClean="0">
-                <a:latin typeface="+mj-lt"/>
-              </a:rPr>
-              <a:t> y solo se busca las notas adecuadas en un instrumento, o si no se tiene una idea clara de la </a:t>
-            </a:r>
-            <a:r>
-              <a:rPr lang="es-MX" dirty="0" err="1" smtClean="0">
-                <a:latin typeface="+mj-lt"/>
-              </a:rPr>
-              <a:t>cancion</a:t>
-            </a:r>
-            <a:r>
-              <a:rPr lang="es-MX" dirty="0" smtClean="0">
-                <a:latin typeface="+mj-lt"/>
-              </a:rPr>
-              <a:t> y se busca crear algo desde cero, en este caso el proceso puede tomar mucho tiempo.</a:t>
-            </a:r>
-          </a:p>
-          <a:p>
-            <a:r>
-              <a:rPr lang="es-MX" dirty="0" err="1" smtClean="0">
-                <a:latin typeface="+mj-lt"/>
-              </a:rPr>
-              <a:t>Tambien</a:t>
-            </a:r>
-            <a:r>
-              <a:rPr lang="es-MX" dirty="0" smtClean="0">
-                <a:latin typeface="+mj-lt"/>
-              </a:rPr>
-              <a:t> otro problema es la falta de ideas al momento de componer.</a:t>
-            </a:r>
-          </a:p>
-          <a:p>
-            <a:r>
-              <a:rPr lang="es-MX" dirty="0" smtClean="0">
+              <a:t>La falta de nuevas ideas dentro de la composición musical es uno de los principales problemas para los músicos.</a:t>
+            </a:r>
+          </a:p>
+          <a:p>
+            <a:r>
+              <a:rPr lang="es-MX" dirty="0">
                 <a:latin typeface="+mj-lt"/>
                 <a:cs typeface="Arial"/>
               </a:rPr>
-              <a:t>Las aplicaciones actuales de </a:t>
-            </a:r>
-            <a:r>
-              <a:rPr lang="es-MX" dirty="0" err="1" smtClean="0">
-                <a:latin typeface="+mj-lt"/>
-                <a:cs typeface="Arial"/>
-              </a:rPr>
-              <a:t>deep</a:t>
-            </a:r>
-            <a:r>
-              <a:rPr lang="es-MX" dirty="0" smtClean="0">
-                <a:latin typeface="+mj-lt"/>
-                <a:cs typeface="Arial"/>
-              </a:rPr>
-              <a:t> </a:t>
-            </a:r>
-            <a:r>
-              <a:rPr lang="es-MX" dirty="0" err="1" smtClean="0">
-                <a:latin typeface="+mj-lt"/>
-                <a:cs typeface="Arial"/>
-              </a:rPr>
-              <a:t>learning</a:t>
-            </a:r>
-            <a:r>
-              <a:rPr lang="es-MX" dirty="0" smtClean="0">
-                <a:latin typeface="+mj-lt"/>
-                <a:cs typeface="Arial"/>
-              </a:rPr>
-              <a:t> para la </a:t>
-            </a:r>
-            <a:r>
-              <a:rPr lang="es-MX" dirty="0" err="1" smtClean="0">
-                <a:latin typeface="+mj-lt"/>
-                <a:cs typeface="Arial"/>
-              </a:rPr>
-              <a:t>creacion</a:t>
-            </a:r>
-            <a:r>
-              <a:rPr lang="es-MX" dirty="0" smtClean="0">
-                <a:latin typeface="+mj-lt"/>
-                <a:cs typeface="Arial"/>
-              </a:rPr>
-              <a:t> musical no permiten la </a:t>
-            </a:r>
-            <a:r>
-              <a:rPr lang="es-MX" dirty="0" err="1" smtClean="0">
-                <a:latin typeface="+mj-lt"/>
-                <a:cs typeface="Arial"/>
-              </a:rPr>
-              <a:t>creacion</a:t>
-            </a:r>
-            <a:r>
-              <a:rPr lang="es-MX" dirty="0" smtClean="0">
-                <a:latin typeface="+mj-lt"/>
-                <a:cs typeface="Arial"/>
-              </a:rPr>
-              <a:t> de </a:t>
-            </a:r>
-            <a:r>
-              <a:rPr lang="es-MX" dirty="0" err="1" smtClean="0">
-                <a:latin typeface="+mj-lt"/>
-                <a:cs typeface="Arial"/>
-              </a:rPr>
-              <a:t>armonias</a:t>
-            </a:r>
-            <a:r>
-              <a:rPr lang="es-MX" dirty="0" smtClean="0">
-                <a:latin typeface="+mj-lt"/>
-                <a:cs typeface="Arial"/>
-              </a:rPr>
-              <a:t> musicales.</a:t>
+              <a:t>Este factor influye directamente con tiempo que le toma a un musico crear una nueva canción.</a:t>
             </a:r>
             <a:endParaRPr lang="es-ES_tradnl" dirty="0">
               <a:latin typeface="+mj-lt"/>
@@ -5337,7 +4997,7 @@
           <a:blip r:embed="rId2">
             <a:extLst>
               <a:ext uri="{28A0092B-C50C-407E-A947-70E740481C1C}">
-                <a14:useLocalDpi xmlns:a14="http://schemas.microsoft.com/office/drawing/2010/main" xmlns="" val="0"/>
+                <a14:useLocalDpi xmlns:a14="http://schemas.microsoft.com/office/drawing/2010/main" val="0"/>
               </a:ext>
             </a:extLst>
           </a:blip>
@@ -5450,15 +5110,7 @@
             </a:r>
             <a:r>
               <a:rPr lang="es-MX" sz="2000" dirty="0"/>
-              <a:t> para </a:t>
-            </a:r>
-            <a:r>
-              <a:rPr lang="es-MX" sz="2000" dirty="0" smtClean="0"/>
-              <a:t>servir de apoyo en una composición </a:t>
-            </a:r>
-            <a:r>
-              <a:rPr lang="es-MX" sz="2000" dirty="0"/>
-              <a:t>musical.</a:t>
+              <a:t> para servir de apoyo en una composición musical.</a:t>
             </a:r>
           </a:p>
         </p:txBody>
@@ -5475,7 +5127,7 @@
           <a:blip r:embed="rId2">
             <a:extLst>
               <a:ext uri="{28A0092B-C50C-407E-A947-70E740481C1C}">
-                <a14:useLocalDpi xmlns:a14="http://schemas.microsoft.com/office/drawing/2010/main" xmlns="" val="0"/>
+                <a14:useLocalDpi xmlns:a14="http://schemas.microsoft.com/office/drawing/2010/main" val="0"/>
               </a:ext>
             </a:extLst>
           </a:blip>
@@ -5505,7 +5157,7 @@
           <a:blip r:embed="rId3">
             <a:extLst>
               <a:ext uri="{28A0092B-C50C-407E-A947-70E740481C1C}">
-                <a14:useLocalDpi xmlns:a14="http://schemas.microsoft.com/office/drawing/2010/main" xmlns="" val="0"/>
+                <a14:useLocalDpi xmlns:a14="http://schemas.microsoft.com/office/drawing/2010/main" val="0"/>
               </a:ext>
             </a:extLst>
           </a:blip>
@@ -5526,7 +5178,7 @@
     </p:spTree>
     <p:extLst>
       <p:ext uri="{BB962C8B-B14F-4D97-AF65-F5344CB8AC3E}">
-        <p14:creationId xmlns:p14="http://schemas.microsoft.com/office/powerpoint/2010/main" xmlns="" val="2396928773"/>
+        <p14:creationId xmlns:p14="http://schemas.microsoft.com/office/powerpoint/2010/main" val="2396928773"/>
       </p:ext>
     </p:extLst>
   </p:cSld>
@@ -5613,7 +5265,7 @@
           <a:lstStyle/>
           <a:p>
             <a:r>
-              <a:rPr lang="es-ES_tradnl" dirty="0" smtClean="0">
+              <a:rPr lang="es-ES_tradnl" dirty="0">
                 <a:solidFill>
                   <a:schemeClr val="tx1">
                     <a:lumMod val="65000"/>
@@ -5626,7 +5278,7 @@
               <a:t>Este proyecto se centrara en crear melodías musicales de guitarra, bajo </a:t>
             </a:r>
             <a:r>
-              <a:rPr lang="es-ES_tradnl" dirty="0" err="1" smtClean="0">
+              <a:rPr lang="es-ES_tradnl" dirty="0" err="1">
                 <a:solidFill>
                   <a:schemeClr val="tx1">
                     <a:lumMod val="65000"/>
@@ -5639,7 +5291,7 @@
               <a:t>asi</a:t>
             </a:r>
             <a:r>
-              <a:rPr lang="es-ES_tradnl" dirty="0" smtClean="0">
+              <a:rPr lang="es-ES_tradnl" dirty="0">
                 <a:solidFill>
                   <a:schemeClr val="tx1">
                     <a:lumMod val="65000"/>
@@ -5654,7 +5306,7 @@
           </a:p>
           <a:p>
             <a:r>
-              <a:rPr lang="es-ES_tradnl" dirty="0" smtClean="0">
+              <a:rPr lang="es-ES_tradnl" dirty="0">
                 <a:solidFill>
                   <a:schemeClr val="tx1">
                     <a:lumMod val="65000"/>
@@ -5666,16 +5318,6 @@
               </a:rPr>
               <a:t>Las nuevas canciones creadas por estos algoritmos no buscan ser ideas finales de composición, la única intensión es crear una serie de ideas para nuevas canciones</a:t>
             </a:r>
-            <a:endParaRPr lang="es-ES_tradnl" dirty="0">
-              <a:solidFill>
-                <a:schemeClr val="tx1">
-                  <a:lumMod val="65000"/>
-                  <a:lumOff val="35000"/>
-                </a:schemeClr>
-              </a:solidFill>
-              <a:latin typeface="Arial"/>
-              <a:cs typeface="Arial"/>
-            </a:endParaRPr>
           </a:p>
         </p:txBody>
       </p:sp>
@@ -5691,7 +5333,7 @@
           <a:blip r:embed="rId2">
             <a:extLst>
               <a:ext uri="{28A0092B-C50C-407E-A947-70E740481C1C}">
-                <a14:useLocalDpi xmlns:a14="http://schemas.microsoft.com/office/drawing/2010/main" xmlns="" val="0"/>
+                <a14:useLocalDpi xmlns:a14="http://schemas.microsoft.com/office/drawing/2010/main" val="0"/>
               </a:ext>
             </a:extLst>
           </a:blip>
@@ -5711,7 +5353,7 @@
           <a:noFill/>
           <a:extLst>
             <a:ext uri="{909E8E84-426E-40DD-AFC4-6F175D3DCCD1}">
-              <a14:hiddenFill xmlns:a14="http://schemas.microsoft.com/office/drawing/2010/main" xmlns="">
+              <a14:hiddenFill xmlns:a14="http://schemas.microsoft.com/office/drawing/2010/main">
                 <a:solidFill>
                   <a:srgbClr val="FFFFFF"/>
                 </a:solidFill>
@@ -5732,7 +5374,7 @@
           <a:blip r:embed="rId3">
             <a:extLst>
               <a:ext uri="{28A0092B-C50C-407E-A947-70E740481C1C}">
-                <a14:useLocalDpi xmlns:a14="http://schemas.microsoft.com/office/drawing/2010/main" xmlns="" val="0"/>
+                <a14:useLocalDpi xmlns:a14="http://schemas.microsoft.com/office/drawing/2010/main" val="0"/>
               </a:ext>
             </a:extLst>
           </a:blip>
@@ -5752,7 +5394,7 @@
           <a:noFill/>
           <a:extLst>
             <a:ext uri="{909E8E84-426E-40DD-AFC4-6F175D3DCCD1}">
-              <a14:hiddenFill xmlns:a14="http://schemas.microsoft.com/office/drawing/2010/main" xmlns="">
+              <a14:hiddenFill xmlns:a14="http://schemas.microsoft.com/office/drawing/2010/main">
                 <a:solidFill>
                   <a:srgbClr val="FFFFFF"/>
                 </a:solidFill>
@@ -5773,7 +5415,7 @@
           <a:blip r:embed="rId4">
             <a:extLst>
               <a:ext uri="{28A0092B-C50C-407E-A947-70E740481C1C}">
-                <a14:useLocalDpi xmlns:a14="http://schemas.microsoft.com/office/drawing/2010/main" xmlns="" val="0"/>
+                <a14:useLocalDpi xmlns:a14="http://schemas.microsoft.com/office/drawing/2010/main" val="0"/>
               </a:ext>
             </a:extLst>
           </a:blip>
@@ -5793,7 +5435,7 @@
           <a:noFill/>
           <a:extLst>
             <a:ext uri="{909E8E84-426E-40DD-AFC4-6F175D3DCCD1}">
-              <a14:hiddenFill xmlns:a14="http://schemas.microsoft.com/office/drawing/2010/main" xmlns="">
+              <a14:hiddenFill xmlns:a14="http://schemas.microsoft.com/office/drawing/2010/main">
                 <a:solidFill>
                   <a:srgbClr val="FFFFFF"/>
                 </a:solidFill>
@@ -5805,7 +5447,7 @@
     </p:spTree>
     <p:extLst>
       <p:ext uri="{BB962C8B-B14F-4D97-AF65-F5344CB8AC3E}">
-        <p14:creationId xmlns:p14="http://schemas.microsoft.com/office/powerpoint/2010/main" xmlns="" val="2661202115"/>
+        <p14:creationId xmlns:p14="http://schemas.microsoft.com/office/powerpoint/2010/main" val="2661202115"/>
       </p:ext>
     </p:extLst>
   </p:cSld>
@@ -5895,25 +5537,13 @@
               <a:rPr lang="es-MX" b="1" dirty="0">
                 <a:latin typeface="+mj-lt"/>
               </a:rPr>
-              <a:t>2002. </a:t>
-            </a:r>
-            <a:r>
-              <a:rPr lang="es-MX" b="1" dirty="0" smtClean="0">
-                <a:latin typeface="+mj-lt"/>
-              </a:rPr>
-              <a:t>“</a:t>
-            </a:r>
-            <a:r>
-              <a:rPr lang="en-US" b="1" dirty="0" smtClean="0">
-                <a:latin typeface="+mj-lt"/>
-              </a:rPr>
-              <a:t>A </a:t>
+              <a:t>2002. “</a:t>
             </a:r>
             <a:r>
               <a:rPr lang="en-US" b="1" dirty="0">
                 <a:latin typeface="+mj-lt"/>
               </a:rPr>
-              <a:t>first look at music composition using </a:t>
+              <a:t>A first look at music composition using </a:t>
             </a:r>
             <a:r>
               <a:rPr lang="en-US" b="1" dirty="0" err="1">
@@ -5928,22 +5558,16 @@
               <a:t> recurrent neural networks. Technical Report No. IDSIA-07-</a:t>
             </a:r>
             <a:r>
-              <a:rPr lang="es-MX" b="1" dirty="0" smtClean="0">
+              <a:rPr lang="es-MX" b="1" dirty="0">
                 <a:latin typeface="+mj-lt"/>
               </a:rPr>
               <a:t>02”, Autores: </a:t>
-            </a:r>
-            <a:r>
-              <a:rPr lang="en-US" b="1" dirty="0" smtClean="0">
-                <a:latin typeface="+mj-lt"/>
-              </a:rPr>
-              <a:t>Douglas </a:t>
             </a:r>
             <a:r>
               <a:rPr lang="en-US" b="1" dirty="0">
                 <a:latin typeface="+mj-lt"/>
               </a:rPr>
-              <a:t>Eck and </a:t>
+              <a:t>Douglas Eck and </a:t>
             </a:r>
             <a:r>
               <a:rPr lang="en-US" b="1" dirty="0" err="1">
@@ -5968,209 +5592,203 @@
                 <a:latin typeface="+mj-lt"/>
               </a:rPr>
               <a:t>. </a:t>
-            </a:r>
-            <a:endParaRPr lang="es-MX" b="1" dirty="0" smtClean="0">
-              <a:latin typeface="+mj-lt"/>
-            </a:endParaRPr>
-          </a:p>
-          <a:p>
-            <a:endParaRPr lang="es-ES" b="1" dirty="0" smtClean="0">
-              <a:latin typeface="+mj-lt"/>
-            </a:endParaRPr>
-          </a:p>
-          <a:p>
-            <a:r>
-              <a:rPr lang="es-ES" b="1" dirty="0" smtClean="0">
-                <a:latin typeface="+mj-lt"/>
-              </a:rPr>
-              <a:t>2009</a:t>
-            </a:r>
-            <a:r>
-              <a:rPr lang="es-ES" b="1" dirty="0">
-                <a:latin typeface="+mj-lt"/>
-              </a:rPr>
-              <a:t>, “</a:t>
-            </a:r>
-            <a:r>
-              <a:rPr lang="es-ES" b="1" dirty="0" err="1">
-                <a:latin typeface="+mj-lt"/>
-              </a:rPr>
-              <a:t>Unsupervised</a:t>
-            </a:r>
-            <a:r>
-              <a:rPr lang="es-ES" b="1" dirty="0">
-                <a:latin typeface="+mj-lt"/>
-              </a:rPr>
-              <a:t> </a:t>
-            </a:r>
-            <a:r>
-              <a:rPr lang="es-ES" b="1" dirty="0" err="1">
-                <a:latin typeface="+mj-lt"/>
-              </a:rPr>
-              <a:t>feature</a:t>
-            </a:r>
-            <a:r>
-              <a:rPr lang="es-ES" b="1" dirty="0">
-                <a:latin typeface="+mj-lt"/>
-              </a:rPr>
-              <a:t> </a:t>
-            </a:r>
-            <a:r>
-              <a:rPr lang="es-ES" b="1" dirty="0" err="1">
-                <a:latin typeface="+mj-lt"/>
-              </a:rPr>
-              <a:t>learning</a:t>
-            </a:r>
-            <a:r>
-              <a:rPr lang="es-ES" b="1" dirty="0">
-                <a:latin typeface="+mj-lt"/>
-              </a:rPr>
-              <a:t> </a:t>
-            </a:r>
-            <a:r>
-              <a:rPr lang="es-ES" b="1" dirty="0" err="1">
-                <a:latin typeface="+mj-lt"/>
-              </a:rPr>
-              <a:t>for</a:t>
-            </a:r>
-            <a:r>
-              <a:rPr lang="es-ES" b="1" dirty="0">
-                <a:latin typeface="+mj-lt"/>
-              </a:rPr>
-              <a:t> audio </a:t>
-            </a:r>
-            <a:r>
-              <a:rPr lang="es-ES" b="1" dirty="0" err="1">
-                <a:latin typeface="+mj-lt"/>
-              </a:rPr>
-              <a:t>classification</a:t>
-            </a:r>
-            <a:r>
-              <a:rPr lang="es-ES" b="1" dirty="0">
-                <a:latin typeface="+mj-lt"/>
-              </a:rPr>
-              <a:t> </a:t>
-            </a:r>
-            <a:r>
-              <a:rPr lang="es-ES" b="1" dirty="0" err="1">
-                <a:latin typeface="+mj-lt"/>
-              </a:rPr>
-              <a:t>using</a:t>
-            </a:r>
-            <a:r>
-              <a:rPr lang="es-ES" b="1" dirty="0">
-                <a:latin typeface="+mj-lt"/>
-              </a:rPr>
-              <a:t> </a:t>
-            </a:r>
-            <a:r>
-              <a:rPr lang="es-ES" b="1" dirty="0" err="1">
-                <a:latin typeface="+mj-lt"/>
-              </a:rPr>
-              <a:t>convolutional</a:t>
-            </a:r>
-            <a:r>
-              <a:rPr lang="es-ES" b="1" dirty="0">
-                <a:latin typeface="+mj-lt"/>
-              </a:rPr>
-              <a:t> </a:t>
-            </a:r>
-            <a:r>
-              <a:rPr lang="es-ES" b="1" dirty="0" err="1">
-                <a:latin typeface="+mj-lt"/>
-              </a:rPr>
-              <a:t>deep</a:t>
-            </a:r>
-            <a:r>
-              <a:rPr lang="es-ES" b="1" dirty="0">
-                <a:latin typeface="+mj-lt"/>
-              </a:rPr>
-              <a:t> </a:t>
-            </a:r>
-            <a:r>
-              <a:rPr lang="es-ES" b="1" dirty="0" err="1">
-                <a:latin typeface="+mj-lt"/>
-              </a:rPr>
-              <a:t>belief</a:t>
-            </a:r>
-            <a:r>
-              <a:rPr lang="es-ES" b="1" dirty="0">
-                <a:latin typeface="+mj-lt"/>
-              </a:rPr>
-              <a:t> </a:t>
-            </a:r>
-            <a:r>
-              <a:rPr lang="es-ES" b="1" dirty="0" err="1">
-                <a:latin typeface="+mj-lt"/>
-              </a:rPr>
-              <a:t>networks</a:t>
-            </a:r>
-            <a:r>
-              <a:rPr lang="es-ES" b="1" dirty="0">
-                <a:latin typeface="+mj-lt"/>
-              </a:rPr>
-              <a:t>”, Autores: </a:t>
-            </a:r>
-            <a:r>
-              <a:rPr lang="es-ES" b="1" dirty="0" err="1">
-                <a:latin typeface="+mj-lt"/>
-              </a:rPr>
-              <a:t>Honglak</a:t>
-            </a:r>
-            <a:r>
-              <a:rPr lang="es-ES" b="1" dirty="0">
-                <a:latin typeface="+mj-lt"/>
-              </a:rPr>
-              <a:t> Lee, </a:t>
-            </a:r>
-            <a:r>
-              <a:rPr lang="es-ES" b="1" dirty="0" err="1">
-                <a:latin typeface="+mj-lt"/>
-              </a:rPr>
-              <a:t>Yan</a:t>
-            </a:r>
-            <a:r>
-              <a:rPr lang="es-ES" b="1" dirty="0">
-                <a:latin typeface="+mj-lt"/>
-              </a:rPr>
-              <a:t> </a:t>
-            </a:r>
-            <a:r>
-              <a:rPr lang="es-ES" b="1" dirty="0" err="1">
-                <a:latin typeface="+mj-lt"/>
-              </a:rPr>
-              <a:t>Largman</a:t>
-            </a:r>
-            <a:r>
-              <a:rPr lang="es-ES" b="1" dirty="0">
-                <a:latin typeface="+mj-lt"/>
-              </a:rPr>
-              <a:t>, Peter </a:t>
-            </a:r>
-            <a:r>
-              <a:rPr lang="es-ES" b="1" dirty="0" err="1">
-                <a:latin typeface="+mj-lt"/>
-              </a:rPr>
-              <a:t>Pham</a:t>
-            </a:r>
-            <a:r>
-              <a:rPr lang="es-ES" b="1" dirty="0">
-                <a:latin typeface="+mj-lt"/>
-              </a:rPr>
-              <a:t>, Andrew Y. </a:t>
-            </a:r>
-            <a:r>
-              <a:rPr lang="es-ES" b="1" dirty="0" err="1">
-                <a:latin typeface="+mj-lt"/>
-              </a:rPr>
-              <a:t>Ng</a:t>
             </a:r>
             <a:endParaRPr lang="es-MX" b="1" dirty="0">
               <a:latin typeface="+mj-lt"/>
             </a:endParaRPr>
           </a:p>
           <a:p>
-            <a:endParaRPr lang="es-ES_tradnl" b="1" dirty="0" smtClean="0">
+            <a:endParaRPr lang="es-ES" b="1" dirty="0">
+              <a:latin typeface="+mj-lt"/>
+            </a:endParaRPr>
+          </a:p>
+          <a:p>
+            <a:r>
+              <a:rPr lang="es-ES" b="1" dirty="0">
+                <a:latin typeface="+mj-lt"/>
+              </a:rPr>
+              <a:t>2009, “</a:t>
+            </a:r>
+            <a:r>
+              <a:rPr lang="es-ES" b="1" dirty="0" err="1">
+                <a:latin typeface="+mj-lt"/>
+              </a:rPr>
+              <a:t>Unsupervised</a:t>
+            </a:r>
+            <a:r>
+              <a:rPr lang="es-ES" b="1" dirty="0">
+                <a:latin typeface="+mj-lt"/>
+              </a:rPr>
+              <a:t> </a:t>
+            </a:r>
+            <a:r>
+              <a:rPr lang="es-ES" b="1" dirty="0" err="1">
+                <a:latin typeface="+mj-lt"/>
+              </a:rPr>
+              <a:t>feature</a:t>
+            </a:r>
+            <a:r>
+              <a:rPr lang="es-ES" b="1" dirty="0">
+                <a:latin typeface="+mj-lt"/>
+              </a:rPr>
+              <a:t> </a:t>
+            </a:r>
+            <a:r>
+              <a:rPr lang="es-ES" b="1" dirty="0" err="1">
+                <a:latin typeface="+mj-lt"/>
+              </a:rPr>
+              <a:t>learning</a:t>
+            </a:r>
+            <a:r>
+              <a:rPr lang="es-ES" b="1" dirty="0">
+                <a:latin typeface="+mj-lt"/>
+              </a:rPr>
+              <a:t> </a:t>
+            </a:r>
+            <a:r>
+              <a:rPr lang="es-ES" b="1" dirty="0" err="1">
+                <a:latin typeface="+mj-lt"/>
+              </a:rPr>
+              <a:t>for</a:t>
+            </a:r>
+            <a:r>
+              <a:rPr lang="es-ES" b="1" dirty="0">
+                <a:latin typeface="+mj-lt"/>
+              </a:rPr>
+              <a:t> audio </a:t>
+            </a:r>
+            <a:r>
+              <a:rPr lang="es-ES" b="1" dirty="0" err="1">
+                <a:latin typeface="+mj-lt"/>
+              </a:rPr>
+              <a:t>classification</a:t>
+            </a:r>
+            <a:r>
+              <a:rPr lang="es-ES" b="1" dirty="0">
+                <a:latin typeface="+mj-lt"/>
+              </a:rPr>
+              <a:t> </a:t>
+            </a:r>
+            <a:r>
+              <a:rPr lang="es-ES" b="1" dirty="0" err="1">
+                <a:latin typeface="+mj-lt"/>
+              </a:rPr>
+              <a:t>using</a:t>
+            </a:r>
+            <a:r>
+              <a:rPr lang="es-ES" b="1" dirty="0">
+                <a:latin typeface="+mj-lt"/>
+              </a:rPr>
+              <a:t> </a:t>
+            </a:r>
+            <a:r>
+              <a:rPr lang="es-ES" b="1" dirty="0" err="1">
+                <a:latin typeface="+mj-lt"/>
+              </a:rPr>
+              <a:t>convolutional</a:t>
+            </a:r>
+            <a:r>
+              <a:rPr lang="es-ES" b="1" dirty="0">
+                <a:latin typeface="+mj-lt"/>
+              </a:rPr>
+              <a:t> </a:t>
+            </a:r>
+            <a:r>
+              <a:rPr lang="es-ES" b="1" dirty="0" err="1">
+                <a:latin typeface="+mj-lt"/>
+              </a:rPr>
+              <a:t>deep</a:t>
+            </a:r>
+            <a:r>
+              <a:rPr lang="es-ES" b="1" dirty="0">
+                <a:latin typeface="+mj-lt"/>
+              </a:rPr>
+              <a:t> </a:t>
+            </a:r>
+            <a:r>
+              <a:rPr lang="es-ES" b="1" dirty="0" err="1">
+                <a:latin typeface="+mj-lt"/>
+              </a:rPr>
+              <a:t>belief</a:t>
+            </a:r>
+            <a:r>
+              <a:rPr lang="es-ES" b="1" dirty="0">
+                <a:latin typeface="+mj-lt"/>
+              </a:rPr>
+              <a:t> </a:t>
+            </a:r>
+            <a:r>
+              <a:rPr lang="es-ES" b="1" dirty="0" err="1">
+                <a:latin typeface="+mj-lt"/>
+              </a:rPr>
+              <a:t>networks</a:t>
+            </a:r>
+            <a:r>
+              <a:rPr lang="es-ES" b="1" dirty="0">
+                <a:latin typeface="+mj-lt"/>
+              </a:rPr>
+              <a:t>”, Autores: </a:t>
+            </a:r>
+            <a:r>
+              <a:rPr lang="es-ES" b="1" dirty="0" err="1">
+                <a:latin typeface="+mj-lt"/>
+              </a:rPr>
+              <a:t>Honglak</a:t>
+            </a:r>
+            <a:r>
+              <a:rPr lang="es-ES" b="1" dirty="0">
+                <a:latin typeface="+mj-lt"/>
+              </a:rPr>
+              <a:t> Lee, </a:t>
+            </a:r>
+            <a:r>
+              <a:rPr lang="es-ES" b="1" dirty="0" err="1">
+                <a:latin typeface="+mj-lt"/>
+              </a:rPr>
+              <a:t>Yan</a:t>
+            </a:r>
+            <a:r>
+              <a:rPr lang="es-ES" b="1" dirty="0">
+                <a:latin typeface="+mj-lt"/>
+              </a:rPr>
+              <a:t> </a:t>
+            </a:r>
+            <a:r>
+              <a:rPr lang="es-ES" b="1" dirty="0" err="1">
+                <a:latin typeface="+mj-lt"/>
+              </a:rPr>
+              <a:t>Largman</a:t>
+            </a:r>
+            <a:r>
+              <a:rPr lang="es-ES" b="1" dirty="0">
+                <a:latin typeface="+mj-lt"/>
+              </a:rPr>
+              <a:t>, Peter </a:t>
+            </a:r>
+            <a:r>
+              <a:rPr lang="es-ES" b="1" dirty="0" err="1">
+                <a:latin typeface="+mj-lt"/>
+              </a:rPr>
+              <a:t>Pham</a:t>
+            </a:r>
+            <a:r>
+              <a:rPr lang="es-ES" b="1" dirty="0">
+                <a:latin typeface="+mj-lt"/>
+              </a:rPr>
+              <a:t>, Andrew Y. </a:t>
+            </a:r>
+            <a:r>
+              <a:rPr lang="es-ES" b="1" dirty="0" err="1">
+                <a:latin typeface="+mj-lt"/>
+              </a:rPr>
+              <a:t>Ng</a:t>
+            </a:r>
+            <a:endParaRPr lang="es-MX" b="1" dirty="0">
+              <a:latin typeface="+mj-lt"/>
+            </a:endParaRPr>
+          </a:p>
+          <a:p>
+            <a:endParaRPr lang="es-ES_tradnl" b="1" dirty="0">
               <a:solidFill>
                 <a:schemeClr val="tx1">
                   <a:lumMod val="65000"/>
@@ -6283,7 +5901,7 @@
             </a:endParaRPr>
           </a:p>
           <a:p>
-            <a:endParaRPr lang="es-ES_tradnl" b="1" dirty="0" smtClean="0">
+            <a:endParaRPr lang="es-ES_tradnl" b="1" dirty="0">
               <a:solidFill>
                 <a:schemeClr val="tx1">
                   <a:lumMod val="65000"/>
@@ -6388,7 +6006,7 @@
     </p:spTree>
     <p:extLst>
       <p:ext uri="{BB962C8B-B14F-4D97-AF65-F5344CB8AC3E}">
-        <p14:creationId xmlns:p14="http://schemas.microsoft.com/office/powerpoint/2010/main" xmlns="" val="3083035170"/>
+        <p14:creationId xmlns:p14="http://schemas.microsoft.com/office/powerpoint/2010/main" val="3083035170"/>
       </p:ext>
     </p:extLst>
   </p:cSld>
@@ -6479,7 +6097,7 @@
     </p:spTree>
     <p:extLst>
       <p:ext uri="{BB962C8B-B14F-4D97-AF65-F5344CB8AC3E}">
-        <p14:creationId xmlns:p14="http://schemas.microsoft.com/office/powerpoint/2010/main" xmlns="" val="1508648440"/>
+        <p14:creationId xmlns:p14="http://schemas.microsoft.com/office/powerpoint/2010/main" val="1508648440"/>
       </p:ext>
     </p:extLst>
   </p:cSld>
@@ -6590,10 +6208,9 @@
           <a:lstStyle/>
           <a:p>
             <a:r>
-              <a:rPr lang="es-MX" dirty="0" smtClean="0"/>
+              <a:rPr lang="es-MX" dirty="0"/>
               <a:t>Red Neuronal</a:t>
             </a:r>
-            <a:endParaRPr lang="es-MX" dirty="0"/>
           </a:p>
         </p:txBody>
       </p:sp>
@@ -6676,7 +6293,7 @@
     </p:spTree>
     <p:extLst>
       <p:ext uri="{BB962C8B-B14F-4D97-AF65-F5344CB8AC3E}">
-        <p14:creationId xmlns:p14="http://schemas.microsoft.com/office/powerpoint/2010/main" xmlns="" val="2363102580"/>
+        <p14:creationId xmlns:p14="http://schemas.microsoft.com/office/powerpoint/2010/main" val="2363102580"/>
       </p:ext>
     </p:extLst>
   </p:cSld>
@@ -6763,7 +6380,7 @@
           <a:lstStyle/>
           <a:p>
             <a:r>
-              <a:rPr lang="es-ES_tradnl" sz="2000" b="1" dirty="0" smtClean="0">
+              <a:rPr lang="es-ES_tradnl" sz="2000" b="1" dirty="0">
                 <a:solidFill>
                   <a:schemeClr val="accent2">
                     <a:lumMod val="75000"/>
@@ -6774,15 +6391,6 @@
               </a:rPr>
               <a:t>Redes Recurrentes LSTM</a:t>
             </a:r>
-            <a:endParaRPr lang="es-ES_tradnl" sz="2000" b="1" dirty="0">
-              <a:solidFill>
-                <a:schemeClr val="accent2">
-                  <a:lumMod val="75000"/>
-                </a:schemeClr>
-              </a:solidFill>
-              <a:latin typeface="Arial"/>
-              <a:cs typeface="Arial"/>
-            </a:endParaRPr>
           </a:p>
           <a:p>
             <a:endParaRPr lang="es-ES_tradnl" dirty="0">
@@ -6825,7 +6433,7 @@
     </p:spTree>
     <p:extLst>
       <p:ext uri="{BB962C8B-B14F-4D97-AF65-F5344CB8AC3E}">
-        <p14:creationId xmlns:p14="http://schemas.microsoft.com/office/powerpoint/2010/main" xmlns="" val="3250406316"/>
+        <p14:creationId xmlns:p14="http://schemas.microsoft.com/office/powerpoint/2010/main" val="3250406316"/>
       </p:ext>
     </p:extLst>
   </p:cSld>
@@ -6912,7 +6520,7 @@
           <a:lstStyle/>
           <a:p>
             <a:r>
-              <a:rPr lang="es-ES_tradnl" sz="2000" b="1" dirty="0" smtClean="0">
+              <a:rPr lang="es-ES_tradnl" sz="2000" b="1" dirty="0">
                 <a:solidFill>
                   <a:schemeClr val="accent2">
                     <a:lumMod val="75000"/>
@@ -6923,15 +6531,6 @@
               </a:rPr>
               <a:t>Formato MIDI</a:t>
             </a:r>
-            <a:endParaRPr lang="es-ES_tradnl" sz="2000" b="1" dirty="0">
-              <a:solidFill>
-                <a:schemeClr val="accent2">
-                  <a:lumMod val="75000"/>
-                </a:schemeClr>
-              </a:solidFill>
-              <a:latin typeface="Arial"/>
-              <a:cs typeface="Arial"/>
-            </a:endParaRPr>
           </a:p>
           <a:p>
             <a:endParaRPr lang="es-ES_tradnl" dirty="0">
@@ -7002,7 +6601,7 @@
     </p:spTree>
     <p:extLst>
       <p:ext uri="{BB962C8B-B14F-4D97-AF65-F5344CB8AC3E}">
-        <p14:creationId xmlns:p14="http://schemas.microsoft.com/office/powerpoint/2010/main" xmlns="" val="735667687"/>
+        <p14:creationId xmlns:p14="http://schemas.microsoft.com/office/powerpoint/2010/main" val="735667687"/>
       </p:ext>
     </p:extLst>
   </p:cSld>

</xml_diff>

<commit_message>
Se cambio la parte del desarrollo de la presentacion
</commit_message>
<xml_diff>
--- a/Presentacion.pptx
+++ b/Presentacion.pptx
@@ -3394,67 +3394,12 @@
           </a:p>
         </p:txBody>
       </p:sp>
-      <p:sp>
-        <p:nvSpPr>
-          <p:cNvPr id="4" name="CuadroTexto 3"/>
-          <p:cNvSpPr txBox="1"/>
-          <p:nvPr/>
-        </p:nvSpPr>
-        <p:spPr>
-          <a:xfrm>
-            <a:off x="457200" y="1371600"/>
-            <a:ext cx="7772400" cy="646331"/>
-          </a:xfrm>
-          <a:prstGeom prst="rect">
-            <a:avLst/>
-          </a:prstGeom>
-          <a:noFill/>
-        </p:spPr>
-        <p:txBody>
-          <a:bodyPr wrap="square" rtlCol="0">
-            <a:spAutoFit/>
-          </a:bodyPr>
-          <a:lstStyle/>
-          <a:p>
-            <a:pPr marL="285750" indent="-285750">
-              <a:buFontTx/>
-              <a:buChar char="-"/>
-            </a:pPr>
-            <a:endParaRPr lang="es-ES_tradnl" dirty="0">
-              <a:solidFill>
-                <a:schemeClr val="tx1">
-                  <a:lumMod val="65000"/>
-                  <a:lumOff val="35000"/>
-                </a:schemeClr>
-              </a:solidFill>
-              <a:latin typeface="Arial"/>
-              <a:cs typeface="Arial"/>
-            </a:endParaRPr>
-          </a:p>
-          <a:p>
-            <a:pPr marL="285750" indent="-285750">
-              <a:buFontTx/>
-              <a:buChar char="-"/>
-            </a:pPr>
-            <a:endParaRPr lang="es-ES_tradnl" dirty="0">
-              <a:solidFill>
-                <a:schemeClr val="tx1">
-                  <a:lumMod val="65000"/>
-                  <a:lumOff val="35000"/>
-                </a:schemeClr>
-              </a:solidFill>
-              <a:latin typeface="Arial"/>
-              <a:cs typeface="Arial"/>
-            </a:endParaRPr>
-          </a:p>
-        </p:txBody>
-      </p:sp>
       <p:pic>
         <p:nvPicPr>
-          <p:cNvPr id="8" name="Picture 7">
+          <p:cNvPr id="2" name="Picture 1">
             <a:extLst>
               <a:ext uri="{FF2B5EF4-FFF2-40B4-BE49-F238E27FC236}">
-                <a16:creationId xmlns:a16="http://schemas.microsoft.com/office/drawing/2014/main" id="{68E01341-255C-4150-B87D-052B943968DE}"/>
+                <a16:creationId xmlns:a16="http://schemas.microsoft.com/office/drawing/2014/main" id="{7F2A39D2-55C6-4546-925A-C78FD89E80B6}"/>
               </a:ext>
             </a:extLst>
           </p:cNvPr>
@@ -3471,8 +3416,8 @@
         </p:blipFill>
         <p:spPr>
           <a:xfrm>
-            <a:off x="147346" y="962105"/>
-            <a:ext cx="8553450" cy="2733675"/>
+            <a:off x="113134" y="3714441"/>
+            <a:ext cx="8883520" cy="1928993"/>
           </a:xfrm>
           <a:prstGeom prst="rect">
             <a:avLst/>
@@ -3481,10 +3426,10 @@
       </p:pic>
       <p:pic>
         <p:nvPicPr>
-          <p:cNvPr id="9" name="Picture 8">
+          <p:cNvPr id="3" name="Picture 2">
             <a:extLst>
               <a:ext uri="{FF2B5EF4-FFF2-40B4-BE49-F238E27FC236}">
-                <a16:creationId xmlns:a16="http://schemas.microsoft.com/office/drawing/2014/main" id="{993CAC42-450C-4005-A7CA-D9F98B66B50D}"/>
+                <a16:creationId xmlns:a16="http://schemas.microsoft.com/office/drawing/2014/main" id="{F5AB56C1-915B-4E50-9258-F2E124001A1D}"/>
               </a:ext>
             </a:extLst>
           </p:cNvPr>
@@ -3501,8 +3446,8 @@
         </p:blipFill>
         <p:spPr>
           <a:xfrm>
-            <a:off x="838200" y="3558958"/>
-            <a:ext cx="5082187" cy="2336937"/>
+            <a:off x="346593" y="1220786"/>
+            <a:ext cx="8401050" cy="2352675"/>
           </a:xfrm>
           <a:prstGeom prst="rect">
             <a:avLst/>

</xml_diff>